<commit_message>
added new distribution image
</commit_message>
<xml_diff>
--- a/Cuisine_Classification.pptx
+++ b/Cuisine_Classification.pptx
@@ -890,11 +890,7 @@
         <a:p>
           <a:r>
             <a:rPr lang="en-US" dirty="0"/>
-            <a:t>Business Problem </a:t>
-          </a:r>
-          <a:r>
-            <a:rPr lang="en-US"/>
-            <a:t>&amp; Understanding</a:t>
+            <a:t>Business Problem &amp; Understanding</a:t>
           </a:r>
         </a:p>
       </dgm:t>
@@ -1402,11 +1398,7 @@
           </a:pPr>
           <a:r>
             <a:rPr lang="en-US" sz="1900" kern="1200" dirty="0"/>
-            <a:t>Business Problem </a:t>
-          </a:r>
-          <a:r>
-            <a:rPr lang="en-US" sz="1900" kern="1200"/>
-            <a:t>&amp; Understanding</a:t>
+            <a:t>Business Problem &amp; Understanding</a:t>
           </a:r>
         </a:p>
       </dsp:txBody>
@@ -12452,10 +12444,10 @@
       </p:grpSpPr>
       <p:sp useBgFill="1">
         <p:nvSpPr>
-          <p:cNvPr id="21" name="Rectangle 8">
+          <p:cNvPr id="31" name="Rectangle 30">
             <a:extLst>
               <a:ext uri="{FF2B5EF4-FFF2-40B4-BE49-F238E27FC236}">
-                <a16:creationId xmlns:a16="http://schemas.microsoft.com/office/drawing/2014/main" id="{1395ACAC-577D-4FAD-955D-280C3D104ADF}"/>
+                <a16:creationId xmlns:a16="http://schemas.microsoft.com/office/drawing/2014/main" id="{8DCA3673-CDE4-40C5-9FA8-F89874CFBA73}"/>
               </a:ext>
               <a:ext uri="{C183D7F6-B498-43B3-948B-1728B52AA6E4}">
                 <adec:decorative xmlns:adec="http://schemas.microsoft.com/office/drawing/2017/decorative" val="1"/>
@@ -12509,10 +12501,10 @@
       </p:sp>
       <p:pic>
         <p:nvPicPr>
-          <p:cNvPr id="22" name="Picture 10">
+          <p:cNvPr id="33" name="Picture 32">
             <a:extLst>
               <a:ext uri="{FF2B5EF4-FFF2-40B4-BE49-F238E27FC236}">
-                <a16:creationId xmlns:a16="http://schemas.microsoft.com/office/drawing/2014/main" id="{E228037F-2EF2-4A1A-8D1D-D08F2C98AD63}"/>
+                <a16:creationId xmlns:a16="http://schemas.microsoft.com/office/drawing/2014/main" id="{95756E8F-499C-4533-BBE8-309C3E8D985C}"/>
               </a:ext>
               <a:ext uri="{C183D7F6-B498-43B3-948B-1728B52AA6E4}">
                 <adec:decorative xmlns:adec="http://schemas.microsoft.com/office/drawing/2017/decorative" val="1"/>
@@ -12555,10 +12547,10 @@
       </p:pic>
       <p:sp>
         <p:nvSpPr>
-          <p:cNvPr id="23" name="Rectangle 12">
+          <p:cNvPr id="35" name="Rectangle 34">
             <a:extLst>
               <a:ext uri="{FF2B5EF4-FFF2-40B4-BE49-F238E27FC236}">
-                <a16:creationId xmlns:a16="http://schemas.microsoft.com/office/drawing/2014/main" id="{0AB11C2E-6CA2-4822-BF14-C1C9A6BC6CAA}"/>
+                <a16:creationId xmlns:a16="http://schemas.microsoft.com/office/drawing/2014/main" id="{0FFFD040-32A9-4D2B-86CA-599D030A4161}"/>
               </a:ext>
               <a:ext uri="{C183D7F6-B498-43B3-948B-1728B52AA6E4}">
                 <adec:decorative xmlns:adec="http://schemas.microsoft.com/office/drawing/2017/decorative" val="1"/>
@@ -12615,10 +12607,10 @@
       </p:sp>
       <p:sp>
         <p:nvSpPr>
-          <p:cNvPr id="24" name="Rectangle 14">
+          <p:cNvPr id="37" name="Rectangle 36">
             <a:extLst>
               <a:ext uri="{FF2B5EF4-FFF2-40B4-BE49-F238E27FC236}">
-                <a16:creationId xmlns:a16="http://schemas.microsoft.com/office/drawing/2014/main" id="{38B3A2B2-7BBB-4E52-8C30-BE2A6F346B37}"/>
+                <a16:creationId xmlns:a16="http://schemas.microsoft.com/office/drawing/2014/main" id="{863205CA-B7FF-4C25-A4C8-3BBBCE19D950}"/>
               </a:ext>
               <a:ext uri="{C183D7F6-B498-43B3-948B-1728B52AA6E4}">
                 <adec:decorative xmlns:adec="http://schemas.microsoft.com/office/drawing/2017/decorative" val="1"/>
@@ -12708,10 +12700,10 @@
       </p:sp>
       <p:pic>
         <p:nvPicPr>
-          <p:cNvPr id="25" name="Picture 16">
+          <p:cNvPr id="39" name="Picture 38">
             <a:extLst>
               <a:ext uri="{FF2B5EF4-FFF2-40B4-BE49-F238E27FC236}">
-                <a16:creationId xmlns:a16="http://schemas.microsoft.com/office/drawing/2014/main" id="{FFF756FE-278B-4106-BB2E-DB87CF02DFB5}"/>
+                <a16:creationId xmlns:a16="http://schemas.microsoft.com/office/drawing/2014/main" id="{306E3F32-3C1A-4B6E-AF26-8A15A788560F}"/>
               </a:ext>
               <a:ext uri="{C183D7F6-B498-43B3-948B-1728B52AA6E4}">
                 <adec:decorative xmlns:adec="http://schemas.microsoft.com/office/drawing/2017/decorative" val="1"/>
@@ -12804,82 +12796,12 @@
           </a:p>
         </p:txBody>
       </p:sp>
-      <p:sp>
-        <p:nvSpPr>
-          <p:cNvPr id="26" name="Rectangle 18">
+      <p:pic>
+        <p:nvPicPr>
+          <p:cNvPr id="6" name="Picture 5">
             <a:extLst>
               <a:ext uri="{FF2B5EF4-FFF2-40B4-BE49-F238E27FC236}">
-                <a16:creationId xmlns:a16="http://schemas.microsoft.com/office/drawing/2014/main" id="{09D6A950-3339-40EB-8972-64F44542D3FF}"/>
-              </a:ext>
-              <a:ext uri="{C183D7F6-B498-43B3-948B-1728B52AA6E4}">
-                <adec:decorative xmlns:adec="http://schemas.microsoft.com/office/drawing/2017/decorative" val="1"/>
-              </a:ext>
-            </a:extLst>
-          </p:cNvPr>
-          <p:cNvSpPr>
-            <a:spLocks noGrp="1" noRot="1" noChangeAspect="1" noMove="1" noResize="1" noEditPoints="1" noAdjustHandles="1" noChangeArrowheads="1" noChangeShapeType="1" noTextEdit="1"/>
-          </p:cNvSpPr>
-          <p:nvPr>
-            <p:extLst>
-              <p:ext uri="{386F3935-93C4-4BCD-93E2-E3B085C9AB24}">
-                <p16:designElem xmlns:p16="http://schemas.microsoft.com/office/powerpoint/2015/main" val="1"/>
-              </p:ext>
-            </p:extLst>
-          </p:nvPr>
-        </p:nvSpPr>
-        <p:spPr>
-          <a:xfrm>
-            <a:off x="5276090" y="642795"/>
-            <a:ext cx="6272654" cy="5575126"/>
-          </a:xfrm>
-          <a:prstGeom prst="rect">
-            <a:avLst/>
-          </a:prstGeom>
-          <a:solidFill>
-            <a:schemeClr val="tx1"/>
-          </a:solidFill>
-          <a:ln>
-            <a:noFill/>
-          </a:ln>
-          <a:effectLst>
-            <a:outerShdw blurRad="76200" dist="63500" dir="5040000" algn="t" rotWithShape="0">
-              <a:prstClr val="black">
-                <a:alpha val="41000"/>
-              </a:prstClr>
-            </a:outerShdw>
-          </a:effectLst>
-        </p:spPr>
-        <p:style>
-          <a:lnRef idx="2">
-            <a:schemeClr val="accent1">
-              <a:shade val="50000"/>
-            </a:schemeClr>
-          </a:lnRef>
-          <a:fillRef idx="1">
-            <a:schemeClr val="accent1"/>
-          </a:fillRef>
-          <a:effectRef idx="0">
-            <a:schemeClr val="accent1"/>
-          </a:effectRef>
-          <a:fontRef idx="minor">
-            <a:schemeClr val="lt1"/>
-          </a:fontRef>
-        </p:style>
-        <p:txBody>
-          <a:bodyPr rtlCol="0" anchor="ctr"/>
-          <a:lstStyle/>
-          <a:p>
-            <a:pPr algn="ctr"/>
-            <a:endParaRPr lang="en-US"/>
-          </a:p>
-        </p:txBody>
-      </p:sp>
-      <p:pic>
-        <p:nvPicPr>
-          <p:cNvPr id="4" name="Picture 3">
-            <a:extLst>
-              <a:ext uri="{FF2B5EF4-FFF2-40B4-BE49-F238E27FC236}">
-                <a16:creationId xmlns:a16="http://schemas.microsoft.com/office/drawing/2014/main" id="{35E5DE0A-33D9-46B8-B82B-3691CE032CF3}"/>
+                <a16:creationId xmlns:a16="http://schemas.microsoft.com/office/drawing/2014/main" id="{F6D91D20-E883-4CFD-84ED-2C920CF52B55}"/>
               </a:ext>
             </a:extLst>
           </p:cNvPr>
@@ -12902,8 +12824,8 @@
         </p:blipFill>
         <p:spPr>
           <a:xfrm>
-            <a:off x="5593085" y="1757931"/>
-            <a:ext cx="5629268" cy="3335343"/>
+            <a:off x="5276090" y="2081062"/>
+            <a:ext cx="6269479" cy="2695876"/>
           </a:xfrm>
           <a:prstGeom prst="rect">
             <a:avLst/>
@@ -12911,7 +12833,13 @@
           <a:ln>
             <a:noFill/>
           </a:ln>
-          <a:effectLst/>
+          <a:effectLst>
+            <a:outerShdw blurRad="76200" dist="63500" dir="5040000" algn="tl" rotWithShape="0">
+              <a:srgbClr val="000000">
+                <a:alpha val="41000"/>
+              </a:srgbClr>
+            </a:outerShdw>
+          </a:effectLst>
         </p:spPr>
       </p:pic>
     </p:spTree>

</xml_diff>